<commit_message>
Contributing the Sprint 3 presentation
</commit_message>
<xml_diff>
--- a/Presentations/Sprint 3 Review.pptx
+++ b/Presentations/Sprint 3 Review.pptx
@@ -1,6 +1,6 @@
 
 <file path=ppt/presentation.xml><?xml version="1.0" encoding="utf-8"?>
-<p:presentation xmlns:a="http://schemas.openxmlformats.org/drawingml/2006/main" xmlns:r="http://schemas.openxmlformats.org/officeDocument/2006/relationships" xmlns:p="http://schemas.openxmlformats.org/presentationml/2006/main">
+<p:presentation xmlns:a="http://schemas.openxmlformats.org/drawingml/2006/main" xmlns:r="http://schemas.openxmlformats.org/officeDocument/2006/relationships" xmlns:p="http://schemas.openxmlformats.org/presentationml/2006/main" saveSubsetFonts="1">
   <p:sldMasterIdLst>
     <p:sldMasterId id="2147483648" r:id="rId1"/>
     <p:sldMasterId id="2147483661" r:id="rId2"/>
@@ -4670,22 +4670,7 @@
                 <a:latin typeface="Gill Sans MT"/>
                 <a:ea typeface="DejaVu Sans"/>
               </a:rPr>
-              <a:t> </a:t>
-            </a:r>
-            <a:r>
-              <a:rPr lang="en-US" spc="-1" smtClean="0">
-                <a:solidFill>
-                  <a:srgbClr val="262626"/>
-                </a:solidFill>
-                <a:uFill>
-                  <a:solidFill>
-                    <a:srgbClr val="FFFFFF"/>
-                  </a:solidFill>
-                </a:uFill>
-                <a:latin typeface="Gill Sans MT"/>
-                <a:ea typeface="DejaVu Sans"/>
-              </a:rPr>
-              <a:t>database.</a:t>
+              <a:t> database.</a:t>
             </a:r>
             <a:endParaRPr lang="en-US" sz="1800" strike="noStrike" spc="-1" dirty="0">
               <a:solidFill>
@@ -4848,6 +4833,96 @@
                 <a:ea typeface="DejaVu Sans"/>
               </a:rPr>
               <a:t>Nick: </a:t>
+            </a:r>
+            <a:r>
+              <a:rPr lang="en-US" spc="-1" dirty="0" smtClean="0">
+                <a:solidFill>
+                  <a:srgbClr val="262626"/>
+                </a:solidFill>
+                <a:uFill>
+                  <a:solidFill>
+                    <a:srgbClr val="FFFFFF"/>
+                  </a:solidFill>
+                </a:uFill>
+                <a:latin typeface="Gill Sans MT"/>
+                <a:ea typeface="DejaVu Sans"/>
+              </a:rPr>
+              <a:t>I worked on refactoring the </a:t>
+            </a:r>
+            <a:r>
+              <a:rPr lang="en-US" spc="-1" dirty="0" err="1" smtClean="0">
+                <a:solidFill>
+                  <a:srgbClr val="262626"/>
+                </a:solidFill>
+                <a:uFill>
+                  <a:solidFill>
+                    <a:srgbClr val="FFFFFF"/>
+                  </a:solidFill>
+                </a:uFill>
+                <a:latin typeface="Gill Sans MT"/>
+                <a:ea typeface="DejaVu Sans"/>
+              </a:rPr>
+              <a:t>Recipe.java</a:t>
+            </a:r>
+            <a:r>
+              <a:rPr lang="en-US" spc="-1" dirty="0" smtClean="0">
+                <a:solidFill>
+                  <a:srgbClr val="262626"/>
+                </a:solidFill>
+                <a:uFill>
+                  <a:solidFill>
+                    <a:srgbClr val="FFFFFF"/>
+                  </a:solidFill>
+                </a:uFill>
+                <a:latin typeface="Gill Sans MT"/>
+                <a:ea typeface="DejaVu Sans"/>
+              </a:rPr>
+              <a:t> and </a:t>
+            </a:r>
+            <a:r>
+              <a:rPr lang="en-US" spc="-1" dirty="0" err="1" smtClean="0">
+                <a:solidFill>
+                  <a:srgbClr val="262626"/>
+                </a:solidFill>
+                <a:uFill>
+                  <a:solidFill>
+                    <a:srgbClr val="FFFFFF"/>
+                  </a:solidFill>
+                </a:uFill>
+                <a:latin typeface="Gill Sans MT"/>
+                <a:ea typeface="DejaVu Sans"/>
+              </a:rPr>
+              <a:t>Constants.java</a:t>
+            </a:r>
+            <a:r>
+              <a:rPr lang="en-US" spc="-1" dirty="0" smtClean="0">
+                <a:solidFill>
+                  <a:srgbClr val="262626"/>
+                </a:solidFill>
+                <a:uFill>
+                  <a:solidFill>
+                    <a:srgbClr val="FFFFFF"/>
+                  </a:solidFill>
+                </a:uFill>
+                <a:latin typeface="Gill Sans MT"/>
+                <a:ea typeface="DejaVu Sans"/>
+              </a:rPr>
+              <a:t> class. I also worked on improving the organization and documentation of </a:t>
+            </a:r>
+            <a:r>
+              <a:rPr lang="en-US" spc="-1" smtClean="0">
+                <a:solidFill>
+                  <a:srgbClr val="262626"/>
+                </a:solidFill>
+                <a:uFill>
+                  <a:solidFill>
+                    <a:srgbClr val="FFFFFF"/>
+                  </a:solidFill>
+                </a:uFill>
+                <a:latin typeface="Gill Sans MT"/>
+                <a:ea typeface="DejaVu Sans"/>
+              </a:rPr>
+              <a:t>our repository by flushing out the README.</a:t>
             </a:r>
             <a:endParaRPr lang="en-US" sz="1800" b="0" strike="noStrike" spc="-1" dirty="0">
               <a:solidFill>

</xml_diff>

<commit_message>
Zack's Portion of Retrospective
</commit_message>
<xml_diff>
--- a/Presentations/Sprint 3 Review.pptx
+++ b/Presentations/Sprint 3 Review.pptx
@@ -4595,25 +4595,10 @@
                 <a:latin typeface="Gill Sans MT"/>
                 <a:ea typeface="DejaVu Sans"/>
               </a:rPr>
-              <a:t>Ed</a:t>
+              <a:t>Ed: </a:t>
             </a:r>
             <a:r>
-              <a:rPr lang="en-US" sz="1800" b="1" strike="noStrike" spc="-1" dirty="0" smtClean="0">
-                <a:solidFill>
-                  <a:srgbClr val="262626"/>
-                </a:solidFill>
-                <a:uFill>
-                  <a:solidFill>
-                    <a:srgbClr val="FFFFFF"/>
-                  </a:solidFill>
-                </a:uFill>
-                <a:latin typeface="Gill Sans MT"/>
-                <a:ea typeface="DejaVu Sans"/>
-              </a:rPr>
-              <a:t>: </a:t>
-            </a:r>
-            <a:r>
-              <a:rPr lang="en-US" sz="1800" strike="noStrike" spc="-1" dirty="0" smtClean="0">
+              <a:rPr lang="en-US" sz="1800" strike="noStrike" spc="-1" dirty="0">
                 <a:solidFill>
                   <a:srgbClr val="262626"/>
                 </a:solidFill>
@@ -4628,7 +4613,7 @@
               <a:t>Worked on getting access to database. </a:t>
             </a:r>
             <a:r>
-              <a:rPr lang="en-US" spc="-1" dirty="0" smtClean="0">
+              <a:rPr lang="en-US" spc="-1" dirty="0">
                 <a:solidFill>
                   <a:srgbClr val="262626"/>
                 </a:solidFill>
@@ -4643,7 +4628,7 @@
               <a:t>Tried to get help from Dr. Lehr. We were unable to gain access to </a:t>
             </a:r>
             <a:r>
-              <a:rPr lang="en-US" spc="-1" dirty="0" err="1" smtClean="0">
+              <a:rPr lang="en-US" spc="-1" dirty="0" err="1">
                 <a:solidFill>
                   <a:srgbClr val="262626"/>
                 </a:solidFill>
@@ -4658,7 +4643,7 @@
               <a:t>aws</a:t>
             </a:r>
             <a:r>
-              <a:rPr lang="en-US" spc="-1" dirty="0" smtClean="0">
+              <a:rPr lang="en-US" spc="-1" dirty="0">
                 <a:solidFill>
                   <a:srgbClr val="262626"/>
                 </a:solidFill>
@@ -4670,22 +4655,7 @@
                 <a:latin typeface="Gill Sans MT"/>
                 <a:ea typeface="DejaVu Sans"/>
               </a:rPr>
-              <a:t> </a:t>
-            </a:r>
-            <a:r>
-              <a:rPr lang="en-US" spc="-1" smtClean="0">
-                <a:solidFill>
-                  <a:srgbClr val="262626"/>
-                </a:solidFill>
-                <a:uFill>
-                  <a:solidFill>
-                    <a:srgbClr val="FFFFFF"/>
-                  </a:solidFill>
-                </a:uFill>
-                <a:latin typeface="Gill Sans MT"/>
-                <a:ea typeface="DejaVu Sans"/>
-              </a:rPr>
-              <a:t>database.</a:t>
+              <a:t> database.</a:t>
             </a:r>
             <a:endParaRPr lang="en-US" sz="1800" strike="noStrike" spc="-1" dirty="0">
               <a:solidFill>
@@ -4754,7 +4724,7 @@
               <a:t> </a:t>
             </a:r>
             <a:r>
-              <a:rPr lang="en-US" spc="-1" dirty="0" smtClean="0">
+              <a:rPr lang="en-US" spc="-1" dirty="0">
                 <a:solidFill>
                   <a:srgbClr val="262626"/>
                 </a:solidFill>
@@ -4769,7 +4739,7 @@
               <a:t>Worked with Zach on refactoring </a:t>
             </a:r>
             <a:r>
-              <a:rPr lang="en-US" spc="-1" dirty="0" err="1" smtClean="0">
+              <a:rPr lang="en-US" spc="-1" dirty="0" err="1">
                 <a:solidFill>
                   <a:srgbClr val="262626"/>
                 </a:solidFill>
@@ -4784,7 +4754,7 @@
               <a:t>MainActivity</a:t>
             </a:r>
             <a:r>
-              <a:rPr lang="en-US" spc="-1" dirty="0" smtClean="0">
+              <a:rPr lang="en-US" spc="-1" dirty="0">
                 <a:solidFill>
                   <a:srgbClr val="262626"/>
                 </a:solidFill>
@@ -5030,9 +5000,99 @@
                 <a:latin typeface="Gill Sans MT"/>
                 <a:ea typeface="DejaVu Sans"/>
               </a:rPr>
-              <a:t>Zach:</a:t>
+              <a:t>Zach: </a:t>
             </a:r>
-            <a:endParaRPr lang="en-US" sz="1800" b="0" strike="noStrike" spc="-1" dirty="0">
+            <a:r>
+              <a:rPr lang="en-US" sz="1800" strike="noStrike" spc="-1" dirty="0">
+                <a:solidFill>
+                  <a:srgbClr val="262626"/>
+                </a:solidFill>
+                <a:uFill>
+                  <a:solidFill>
+                    <a:srgbClr val="FFFFFF"/>
+                  </a:solidFill>
+                </a:uFill>
+                <a:latin typeface="Gill Sans MT"/>
+                <a:ea typeface="DejaVu Sans"/>
+              </a:rPr>
+              <a:t>Worked </a:t>
+            </a:r>
+            <a:r>
+              <a:rPr lang="en-US" spc="-1" dirty="0">
+                <a:solidFill>
+                  <a:srgbClr val="262626"/>
+                </a:solidFill>
+                <a:uFill>
+                  <a:solidFill>
+                    <a:srgbClr val="FFFFFF"/>
+                  </a:solidFill>
+                </a:uFill>
+                <a:latin typeface="Gill Sans MT"/>
+                <a:ea typeface="DejaVu Sans"/>
+              </a:rPr>
+              <a:t>with Forrest to refactor </a:t>
+            </a:r>
+            <a:r>
+              <a:rPr lang="en-US" spc="-1" dirty="0" err="1">
+                <a:solidFill>
+                  <a:srgbClr val="262626"/>
+                </a:solidFill>
+                <a:uFill>
+                  <a:solidFill>
+                    <a:srgbClr val="FFFFFF"/>
+                  </a:solidFill>
+                </a:uFill>
+                <a:latin typeface="Gill Sans MT"/>
+                <a:ea typeface="DejaVu Sans"/>
+              </a:rPr>
+              <a:t>MainActivity</a:t>
+            </a:r>
+            <a:r>
+              <a:rPr lang="en-US" spc="-1" dirty="0">
+                <a:solidFill>
+                  <a:srgbClr val="262626"/>
+                </a:solidFill>
+                <a:uFill>
+                  <a:solidFill>
+                    <a:srgbClr val="FFFFFF"/>
+                  </a:solidFill>
+                </a:uFill>
+                <a:latin typeface="Gill Sans MT"/>
+                <a:ea typeface="DejaVu Sans"/>
+              </a:rPr>
+              <a:t> class. Set up Login Activity so that Sherman could integrate login API.  Worked with Christian to </a:t>
+            </a:r>
+            <a:r>
+              <a:rPr lang="en-US" spc="-1">
+                <a:solidFill>
+                  <a:srgbClr val="262626"/>
+                </a:solidFill>
+                <a:uFill>
+                  <a:solidFill>
+                    <a:srgbClr val="FFFFFF"/>
+                  </a:solidFill>
+                </a:uFill>
+                <a:latin typeface="Gill Sans MT"/>
+                <a:ea typeface="DejaVu Sans"/>
+              </a:rPr>
+              <a:t>integrate project with </a:t>
+            </a:r>
+            <a:r>
+              <a:rPr lang="en-US" spc="-1" dirty="0">
+                <a:solidFill>
+                  <a:srgbClr val="262626"/>
+                </a:solidFill>
+                <a:uFill>
+                  <a:solidFill>
+                    <a:srgbClr val="FFFFFF"/>
+                  </a:solidFill>
+                </a:uFill>
+                <a:latin typeface="Gill Sans MT"/>
+                <a:ea typeface="DejaVu Sans"/>
+              </a:rPr>
+              <a:t>Travis CI.</a:t>
+            </a:r>
+            <a:endParaRPr lang="en-US" sz="1800" strike="noStrike" spc="-1" dirty="0">
               <a:solidFill>
                 <a:srgbClr val="000000"/>
               </a:solidFill>

</xml_diff>